<commit_message>
Modification Mise en Page
</commit_message>
<xml_diff>
--- a/Review2.pptx
+++ b/Review2.pptx
@@ -16501,7 +16501,7 @@
           <a:p>
             <a:fld id="{14BAB751-4EFE-4D1A-B5AD-3040FD38AFAB}" type="datetimeFigureOut">
               <a:rPr lang="fr-FR" smtClean="0"/>
-              <a:t>05/12/2021</a:t>
+              <a:t>06/12/2021</a:t>
             </a:fld>
             <a:endParaRPr lang="fr-FR"/>
           </a:p>
@@ -16699,7 +16699,7 @@
           <a:p>
             <a:fld id="{14BAB751-4EFE-4D1A-B5AD-3040FD38AFAB}" type="datetimeFigureOut">
               <a:rPr lang="fr-FR" smtClean="0"/>
-              <a:t>05/12/2021</a:t>
+              <a:t>06/12/2021</a:t>
             </a:fld>
             <a:endParaRPr lang="fr-FR"/>
           </a:p>
@@ -16907,7 +16907,7 @@
           <a:p>
             <a:fld id="{14BAB751-4EFE-4D1A-B5AD-3040FD38AFAB}" type="datetimeFigureOut">
               <a:rPr lang="fr-FR" smtClean="0"/>
-              <a:t>05/12/2021</a:t>
+              <a:t>06/12/2021</a:t>
             </a:fld>
             <a:endParaRPr lang="fr-FR"/>
           </a:p>
@@ -17105,7 +17105,7 @@
           <a:p>
             <a:fld id="{14BAB751-4EFE-4D1A-B5AD-3040FD38AFAB}" type="datetimeFigureOut">
               <a:rPr lang="fr-FR" smtClean="0"/>
-              <a:t>05/12/2021</a:t>
+              <a:t>06/12/2021</a:t>
             </a:fld>
             <a:endParaRPr lang="fr-FR"/>
           </a:p>
@@ -17380,7 +17380,7 @@
           <a:p>
             <a:fld id="{14BAB751-4EFE-4D1A-B5AD-3040FD38AFAB}" type="datetimeFigureOut">
               <a:rPr lang="fr-FR" smtClean="0"/>
-              <a:t>05/12/2021</a:t>
+              <a:t>06/12/2021</a:t>
             </a:fld>
             <a:endParaRPr lang="fr-FR"/>
           </a:p>
@@ -17645,7 +17645,7 @@
           <a:p>
             <a:fld id="{14BAB751-4EFE-4D1A-B5AD-3040FD38AFAB}" type="datetimeFigureOut">
               <a:rPr lang="fr-FR" smtClean="0"/>
-              <a:t>05/12/2021</a:t>
+              <a:t>06/12/2021</a:t>
             </a:fld>
             <a:endParaRPr lang="fr-FR"/>
           </a:p>
@@ -18057,7 +18057,7 @@
           <a:p>
             <a:fld id="{14BAB751-4EFE-4D1A-B5AD-3040FD38AFAB}" type="datetimeFigureOut">
               <a:rPr lang="fr-FR" smtClean="0"/>
-              <a:t>05/12/2021</a:t>
+              <a:t>06/12/2021</a:t>
             </a:fld>
             <a:endParaRPr lang="fr-FR"/>
           </a:p>
@@ -18198,7 +18198,7 @@
           <a:p>
             <a:fld id="{14BAB751-4EFE-4D1A-B5AD-3040FD38AFAB}" type="datetimeFigureOut">
               <a:rPr lang="fr-FR" smtClean="0"/>
-              <a:t>05/12/2021</a:t>
+              <a:t>06/12/2021</a:t>
             </a:fld>
             <a:endParaRPr lang="fr-FR"/>
           </a:p>
@@ -18311,7 +18311,7 @@
           <a:p>
             <a:fld id="{14BAB751-4EFE-4D1A-B5AD-3040FD38AFAB}" type="datetimeFigureOut">
               <a:rPr lang="fr-FR" smtClean="0"/>
-              <a:t>05/12/2021</a:t>
+              <a:t>06/12/2021</a:t>
             </a:fld>
             <a:endParaRPr lang="fr-FR"/>
           </a:p>
@@ -18622,7 +18622,7 @@
           <a:p>
             <a:fld id="{14BAB751-4EFE-4D1A-B5AD-3040FD38AFAB}" type="datetimeFigureOut">
               <a:rPr lang="fr-FR" smtClean="0"/>
-              <a:t>05/12/2021</a:t>
+              <a:t>06/12/2021</a:t>
             </a:fld>
             <a:endParaRPr lang="fr-FR"/>
           </a:p>
@@ -18910,7 +18910,7 @@
           <a:p>
             <a:fld id="{14BAB751-4EFE-4D1A-B5AD-3040FD38AFAB}" type="datetimeFigureOut">
               <a:rPr lang="fr-FR" smtClean="0"/>
-              <a:t>05/12/2021</a:t>
+              <a:t>06/12/2021</a:t>
             </a:fld>
             <a:endParaRPr lang="fr-FR"/>
           </a:p>
@@ -19151,7 +19151,7 @@
           <a:p>
             <a:fld id="{14BAB751-4EFE-4D1A-B5AD-3040FD38AFAB}" type="datetimeFigureOut">
               <a:rPr lang="fr-FR" smtClean="0"/>
-              <a:t>05/12/2021</a:t>
+              <a:t>06/12/2021</a:t>
             </a:fld>
             <a:endParaRPr lang="fr-FR"/>
           </a:p>
@@ -19828,13 +19828,17 @@
           <a:p>
             <a:r>
               <a:rPr lang="fr-FR" sz="1100"/>
-              <a:t>Hugo CARLIN Valentine CROIBIEN Emilie PIERQUIN Adrien SAGRAFENA </a:t>
+              <a:t>Hugo CARLIN, Valentine CROIBIEN, Emilie PIERQUIN, </a:t>
+            </a:r>
+            <a:r>
+              <a:rPr lang="fr-FR" sz="1100" dirty="0"/>
+              <a:t>Adrien SAGRAFENA </a:t>
             </a:r>
           </a:p>
           <a:p>
             <a:r>
-              <a:rPr lang="fr-FR" sz="1100"/>
-              <a:t>22  novembre 2021</a:t>
+              <a:rPr lang="fr-FR" sz="1100" dirty="0"/>
+              <a:t> 06 décembre 2021</a:t>
             </a:r>
           </a:p>
         </p:txBody>
@@ -28343,101 +28347,20 @@
               <a:buChar char="•"/>
             </a:pPr>
             <a:r>
-              <a:rPr lang="en-US" sz="2000" dirty="0" err="1"/>
-              <a:t>Niveaux</a:t>
+              <a:rPr lang="fr-FR" sz="2000" dirty="0"/>
+              <a:t>Niveaux de gravité les plus présents : </a:t>
             </a:r>
             <a:r>
-              <a:rPr lang="en-US" sz="2000" dirty="0"/>
-              <a:t> de </a:t>
-            </a:r>
-            <a:r>
-              <a:rPr lang="en-US" sz="2000" dirty="0" err="1"/>
-              <a:t>gravité</a:t>
-            </a:r>
-            <a:r>
-              <a:rPr lang="en-US" sz="2000" dirty="0"/>
-              <a:t> les plus </a:t>
-            </a:r>
-            <a:r>
-              <a:rPr lang="en-US" sz="2000" dirty="0" err="1"/>
-              <a:t>présents</a:t>
-            </a:r>
-            <a:r>
-              <a:rPr lang="en-US" sz="2000" dirty="0"/>
-              <a:t> : </a:t>
-            </a:r>
-            <a:r>
-              <a:rPr lang="en-US" sz="2000" dirty="0" err="1"/>
+              <a:rPr lang="fr-FR" sz="2000" b="1" dirty="0"/>
               <a:t>Indemne</a:t>
             </a:r>
             <a:r>
-              <a:rPr lang="en-US" sz="2000" dirty="0"/>
-              <a:t> </a:t>
+              <a:rPr lang="fr-FR" sz="2000" dirty="0"/>
+              <a:t> ou </a:t>
             </a:r>
             <a:r>
-              <a:rPr lang="en-US" sz="2000" dirty="0" err="1"/>
-              <a:t>ou</a:t>
-            </a:r>
-            <a:r>
-              <a:rPr lang="en-US" sz="2000" dirty="0"/>
-              <a:t> </a:t>
-            </a:r>
-            <a:r>
-              <a:rPr lang="en-US" sz="2000" dirty="0" err="1"/>
-              <a:t>blessé</a:t>
-            </a:r>
-            <a:r>
-              <a:rPr lang="en-US" sz="2000" dirty="0"/>
-              <a:t> </a:t>
-            </a:r>
-            <a:r>
-              <a:rPr lang="en-US" sz="2000" dirty="0" err="1"/>
-              <a:t>léger</a:t>
-            </a:r>
-            <a:endParaRPr lang="en-US" sz="2000" dirty="0"/>
-          </a:p>
-          <a:p>
-            <a:pPr marL="285750" indent="-228600" algn="just">
-              <a:lnSpc>
-                <a:spcPct val="90000"/>
-              </a:lnSpc>
-              <a:spcAft>
-                <a:spcPts val="600"/>
-              </a:spcAft>
-              <a:buFont typeface="Arial" panose="020B0604020202020204" pitchFamily="34" charset="0"/>
-              <a:buChar char="•"/>
-            </a:pPr>
-            <a:r>
-              <a:rPr lang="en-US" sz="2000" dirty="0" err="1"/>
-              <a:t>Peu</a:t>
-            </a:r>
-            <a:r>
-              <a:rPr lang="en-US" sz="2000" dirty="0"/>
-              <a:t> de </a:t>
-            </a:r>
-            <a:r>
-              <a:rPr lang="en-US" sz="2000" dirty="0" err="1"/>
-              <a:t>tués</a:t>
-            </a:r>
-            <a:r>
-              <a:rPr lang="en-US" sz="2000" dirty="0"/>
-              <a:t> dans la </a:t>
-            </a:r>
-            <a:r>
-              <a:rPr lang="en-US" sz="2000" dirty="0" err="1"/>
-              <a:t>catégorie</a:t>
-            </a:r>
-            <a:r>
-              <a:rPr lang="en-US" sz="2000" dirty="0"/>
-              <a:t> </a:t>
-            </a:r>
-            <a:r>
-              <a:rPr lang="en-US" sz="2000" dirty="0" err="1"/>
-              <a:t>d’usagers</a:t>
-            </a:r>
-            <a:r>
-              <a:rPr lang="en-US" sz="2000" dirty="0"/>
-              <a:t> PASSAGERS</a:t>
+              <a:rPr lang="fr-FR" sz="2000" b="1" dirty="0"/>
+              <a:t>blessé léger</a:t>
             </a:r>
           </a:p>
           <a:p>
@@ -28452,36 +28375,20 @@
               <a:buChar char="•"/>
             </a:pPr>
             <a:r>
-              <a:rPr lang="en-US" sz="2000" dirty="0" err="1"/>
-              <a:t>Peu</a:t>
+              <a:rPr lang="fr-FR" sz="2000" dirty="0"/>
+              <a:t>Peu de </a:t>
             </a:r>
             <a:r>
-              <a:rPr lang="en-US" sz="2000" dirty="0"/>
-              <a:t> de </a:t>
+              <a:rPr lang="fr-FR" sz="2000" b="1" dirty="0"/>
+              <a:t>tués</a:t>
             </a:r>
             <a:r>
-              <a:rPr lang="en-US" sz="2000" dirty="0" err="1"/>
-              <a:t>personnes</a:t>
+              <a:rPr lang="fr-FR" sz="2000" dirty="0"/>
+              <a:t> dans la catégorie d’usagers </a:t>
             </a:r>
             <a:r>
-              <a:rPr lang="en-US" sz="2000" dirty="0"/>
-              <a:t> </a:t>
-            </a:r>
-            <a:r>
-              <a:rPr lang="en-US" sz="2000" dirty="0" err="1"/>
-              <a:t>indemne</a:t>
-            </a:r>
-            <a:r>
-              <a:rPr lang="en-US" sz="2000" dirty="0"/>
-              <a:t> dans la </a:t>
-            </a:r>
-            <a:r>
-              <a:rPr lang="en-US" sz="2000" dirty="0" err="1"/>
-              <a:t>catégorie</a:t>
-            </a:r>
-            <a:r>
-              <a:rPr lang="en-US" sz="2000" dirty="0"/>
-              <a:t> PIÉTON</a:t>
+              <a:rPr lang="fr-FR" sz="2000" b="1" dirty="0"/>
+              <a:t>PASSAGERS</a:t>
             </a:r>
           </a:p>
           <a:p>
@@ -28496,73 +28403,20 @@
               <a:buChar char="•"/>
             </a:pPr>
             <a:r>
-              <a:rPr lang="en-US" sz="2000" dirty="0"/>
-              <a:t>PASSAGER et PIÉTON </a:t>
+              <a:rPr lang="fr-FR" sz="2000" dirty="0"/>
+              <a:t>Peu de personnes </a:t>
             </a:r>
             <a:r>
-              <a:rPr lang="en-US" sz="2000" dirty="0" err="1"/>
-              <a:t>répartis</a:t>
-            </a:r>
-            <a:r>
-              <a:rPr lang="en-US" sz="2000" dirty="0"/>
-              <a:t> de la </a:t>
-            </a:r>
-            <a:r>
-              <a:rPr lang="en-US" sz="2000" dirty="0" err="1"/>
-              <a:t>même</a:t>
-            </a:r>
-            <a:r>
-              <a:rPr lang="en-US" sz="2000" dirty="0"/>
-              <a:t> manière au </a:t>
-            </a:r>
-            <a:r>
-              <a:rPr lang="en-US" sz="2000" dirty="0" err="1"/>
-              <a:t>niveau</a:t>
-            </a:r>
-            <a:r>
-              <a:rPr lang="en-US" sz="2000" dirty="0"/>
-              <a:t> des types de </a:t>
-            </a:r>
-            <a:r>
-              <a:rPr lang="en-US" sz="2000" dirty="0" err="1"/>
-              <a:t>gravité</a:t>
-            </a:r>
-            <a:endParaRPr lang="en-US" sz="2000" dirty="0"/>
-          </a:p>
-          <a:p>
-            <a:pPr marL="285750" indent="-228600" algn="just">
-              <a:lnSpc>
-                <a:spcPct val="90000"/>
-              </a:lnSpc>
-              <a:spcAft>
-                <a:spcPts val="600"/>
-              </a:spcAft>
-              <a:buFont typeface="Arial" panose="020B0604020202020204" pitchFamily="34" charset="0"/>
-              <a:buChar char="•"/>
-            </a:pPr>
-            <a:r>
-              <a:rPr lang="en-US" sz="2000" dirty="0" err="1"/>
-              <a:t>Peu</a:t>
-            </a:r>
-            <a:r>
-              <a:rPr lang="en-US" sz="2000" dirty="0"/>
-              <a:t> de </a:t>
-            </a:r>
-            <a:r>
-              <a:rPr lang="en-US" sz="2000" dirty="0" err="1"/>
-              <a:t>personnes</a:t>
-            </a:r>
-            <a:r>
-              <a:rPr lang="en-US" sz="2000" dirty="0"/>
-              <a:t> </a:t>
-            </a:r>
-            <a:r>
-              <a:rPr lang="en-US" sz="2000" dirty="0" err="1"/>
+              <a:rPr lang="fr-FR" sz="2000" b="1" dirty="0"/>
               <a:t>indemne</a:t>
             </a:r>
             <a:r>
-              <a:rPr lang="en-US" sz="2000" dirty="0"/>
-              <a:t> chez les PIÉTONS</a:t>
+              <a:rPr lang="fr-FR" sz="2000" dirty="0"/>
+              <a:t> dans la catégorie </a:t>
+            </a:r>
+            <a:r>
+              <a:rPr lang="fr-FR" sz="2000" b="1" dirty="0"/>
+              <a:t>PIÉTON</a:t>
             </a:r>
           </a:p>
           <a:p>
@@ -28577,122 +28431,24 @@
               <a:buChar char="•"/>
             </a:pPr>
             <a:r>
-              <a:rPr lang="en-US" sz="2000" dirty="0"/>
-              <a:t>BOUE = plus de </a:t>
+              <a:rPr lang="fr-FR" sz="2000" b="1" dirty="0"/>
+              <a:t>PASSAGER</a:t>
             </a:r>
             <a:r>
-              <a:rPr lang="en-US" sz="2000" dirty="0" err="1"/>
-              <a:t>blessés</a:t>
+              <a:rPr lang="fr-FR" sz="2000" dirty="0"/>
+              <a:t> et </a:t>
             </a:r>
             <a:r>
-              <a:rPr lang="en-US" sz="2000" dirty="0"/>
-              <a:t> </a:t>
+              <a:rPr lang="fr-FR" sz="2000" b="1" dirty="0"/>
+              <a:t>PIÉTON</a:t>
             </a:r>
             <a:r>
-              <a:rPr lang="en-US" sz="2000" dirty="0" err="1"/>
-              <a:t>hospitalisés</a:t>
+              <a:rPr lang="fr-FR" sz="2000" dirty="0"/>
+              <a:t> répartis de la même manière au niveau des types de </a:t>
             </a:r>
             <a:r>
-              <a:rPr lang="en-US" sz="2000" dirty="0"/>
-              <a:t> </a:t>
-            </a:r>
-            <a:r>
-              <a:rPr lang="en-US" sz="2000" dirty="0" err="1"/>
-              <a:t>ou</a:t>
-            </a:r>
-            <a:r>
-              <a:rPr lang="en-US" sz="2000" dirty="0"/>
-              <a:t> </a:t>
-            </a:r>
-            <a:r>
-              <a:rPr lang="en-US" sz="2000" dirty="0" err="1"/>
-              <a:t>légers</a:t>
-            </a:r>
-            <a:endParaRPr lang="en-US" sz="2000" dirty="0"/>
-          </a:p>
-          <a:p>
-            <a:pPr marL="285750" indent="-228600" algn="just">
-              <a:lnSpc>
-                <a:spcPct val="90000"/>
-              </a:lnSpc>
-              <a:spcAft>
-                <a:spcPts val="600"/>
-              </a:spcAft>
-              <a:buFont typeface="Arial" panose="020B0604020202020204" pitchFamily="34" charset="0"/>
-              <a:buChar char="•"/>
-            </a:pPr>
-            <a:r>
-              <a:rPr lang="en-US" sz="2000" dirty="0"/>
-              <a:t>Plus de </a:t>
-            </a:r>
-            <a:r>
-              <a:rPr lang="en-US" sz="2000" dirty="0" err="1"/>
-              <a:t>personnes</a:t>
-            </a:r>
-            <a:r>
-              <a:rPr lang="en-US" sz="2000" dirty="0"/>
-              <a:t> </a:t>
-            </a:r>
-            <a:r>
-              <a:rPr lang="en-US" sz="2000" dirty="0" err="1"/>
-              <a:t>tuées</a:t>
-            </a:r>
-            <a:r>
-              <a:rPr lang="en-US" sz="2000" dirty="0"/>
-              <a:t> sur les routes </a:t>
-            </a:r>
-            <a:r>
-              <a:rPr lang="en-US" sz="2000" dirty="0" err="1"/>
-              <a:t>départementales</a:t>
-            </a:r>
-            <a:endParaRPr lang="en-US" sz="2000" dirty="0"/>
-          </a:p>
-          <a:p>
-            <a:pPr marL="285750" indent="-228600" algn="just">
-              <a:lnSpc>
-                <a:spcPct val="90000"/>
-              </a:lnSpc>
-              <a:spcAft>
-                <a:spcPts val="600"/>
-              </a:spcAft>
-              <a:buFont typeface="Arial" panose="020B0604020202020204" pitchFamily="34" charset="0"/>
-              <a:buChar char="•"/>
-            </a:pPr>
-            <a:r>
-              <a:rPr lang="en-US" sz="2000" dirty="0"/>
-              <a:t>Plus de </a:t>
-            </a:r>
-            <a:r>
-              <a:rPr lang="en-US" sz="2000" dirty="0" err="1"/>
-              <a:t>blessés</a:t>
-            </a:r>
-            <a:r>
-              <a:rPr lang="en-US" sz="2000" dirty="0"/>
-              <a:t> </a:t>
-            </a:r>
-            <a:r>
-              <a:rPr lang="en-US" sz="2000" dirty="0" err="1"/>
-              <a:t>hospitalisés</a:t>
-            </a:r>
-            <a:r>
-              <a:rPr lang="en-US" sz="2000" dirty="0"/>
-              <a:t> que de </a:t>
-            </a:r>
-            <a:r>
-              <a:rPr lang="en-US" sz="2000" dirty="0" err="1"/>
-              <a:t>blessés</a:t>
-            </a:r>
-            <a:r>
-              <a:rPr lang="en-US" sz="2000" dirty="0"/>
-              <a:t> </a:t>
-            </a:r>
-            <a:r>
-              <a:rPr lang="en-US" sz="2000" dirty="0" err="1"/>
-              <a:t>légers</a:t>
-            </a:r>
-            <a:r>
-              <a:rPr lang="en-US" sz="2000" dirty="0"/>
-              <a:t> dans les accidents avec des quads</a:t>
+              <a:rPr lang="fr-FR" sz="2000" b="1" dirty="0"/>
+              <a:t>gravité</a:t>
             </a:r>
           </a:p>
           <a:p>
@@ -28707,38 +28463,137 @@
               <a:buChar char="•"/>
             </a:pPr>
             <a:r>
-              <a:rPr lang="en-US" sz="2000" dirty="0"/>
-              <a:t>Plus de </a:t>
+              <a:rPr lang="fr-FR" sz="2000" dirty="0"/>
+              <a:t>Peu de personnes </a:t>
             </a:r>
             <a:r>
-              <a:rPr lang="en-US" sz="2000" dirty="0" err="1"/>
-              <a:t>personnes</a:t>
+              <a:rPr lang="fr-FR" sz="2000" b="1" dirty="0"/>
+              <a:t>indemne</a:t>
             </a:r>
             <a:r>
-              <a:rPr lang="en-US" sz="2000" dirty="0"/>
-              <a:t> </a:t>
+              <a:rPr lang="fr-FR" sz="2000" dirty="0"/>
+              <a:t> chez les </a:t>
             </a:r>
             <a:r>
-              <a:rPr lang="en-US" sz="2000" dirty="0" err="1"/>
+              <a:rPr lang="fr-FR" sz="2000" b="1" dirty="0"/>
+              <a:t>PIÉTONS</a:t>
+            </a:r>
+          </a:p>
+          <a:p>
+            <a:pPr marL="285750" indent="-228600" algn="just">
+              <a:lnSpc>
+                <a:spcPct val="90000"/>
+              </a:lnSpc>
+              <a:spcAft>
+                <a:spcPts val="600"/>
+              </a:spcAft>
+              <a:buFont typeface="Arial" panose="020B0604020202020204" pitchFamily="34" charset="0"/>
+              <a:buChar char="•"/>
+            </a:pPr>
+            <a:r>
+              <a:rPr lang="fr-FR" sz="2000" b="1" dirty="0"/>
+              <a:t>BOUE</a:t>
+            </a:r>
+            <a:r>
+              <a:rPr lang="fr-FR" sz="2000" dirty="0"/>
+              <a:t> = plus de </a:t>
+            </a:r>
+            <a:r>
+              <a:rPr lang="fr-FR" sz="2000" b="1" dirty="0"/>
+              <a:t>blessés hospitalisés</a:t>
+            </a:r>
+            <a:r>
+              <a:rPr lang="fr-FR" sz="2000" dirty="0"/>
+              <a:t> ou </a:t>
+            </a:r>
+            <a:r>
+              <a:rPr lang="fr-FR" sz="2000" b="1" dirty="0"/>
+              <a:t>légers</a:t>
+            </a:r>
+          </a:p>
+          <a:p>
+            <a:pPr marL="285750" indent="-228600" algn="just">
+              <a:lnSpc>
+                <a:spcPct val="90000"/>
+              </a:lnSpc>
+              <a:spcAft>
+                <a:spcPts val="600"/>
+              </a:spcAft>
+              <a:buFont typeface="Arial" panose="020B0604020202020204" pitchFamily="34" charset="0"/>
+              <a:buChar char="•"/>
+            </a:pPr>
+            <a:r>
+              <a:rPr lang="fr-FR" sz="2000" dirty="0"/>
+              <a:t>Plus de personnes </a:t>
+            </a:r>
+            <a:r>
+              <a:rPr lang="fr-FR" sz="2000" b="1" dirty="0"/>
+              <a:t>tuées</a:t>
+            </a:r>
+            <a:r>
+              <a:rPr lang="fr-FR" sz="2000" dirty="0"/>
+              <a:t> sur les routes </a:t>
+            </a:r>
+            <a:r>
+              <a:rPr lang="fr-FR" sz="2000" b="1" dirty="0"/>
+              <a:t>départementales</a:t>
+            </a:r>
+          </a:p>
+          <a:p>
+            <a:pPr marL="285750" indent="-228600" algn="just">
+              <a:lnSpc>
+                <a:spcPct val="90000"/>
+              </a:lnSpc>
+              <a:spcAft>
+                <a:spcPts val="600"/>
+              </a:spcAft>
+              <a:buFont typeface="Arial" panose="020B0604020202020204" pitchFamily="34" charset="0"/>
+              <a:buChar char="•"/>
+            </a:pPr>
+            <a:r>
+              <a:rPr lang="fr-FR" sz="2000" dirty="0"/>
+              <a:t>Plus de bl</a:t>
+            </a:r>
+            <a:r>
+              <a:rPr lang="fr-FR" sz="2000" b="1" dirty="0"/>
+              <a:t>essés hospitalisés </a:t>
+            </a:r>
+            <a:r>
+              <a:rPr lang="fr-FR" sz="2000" dirty="0"/>
+              <a:t>que de blessés légers dans les accidents avec des </a:t>
+            </a:r>
+            <a:r>
+              <a:rPr lang="fr-FR" sz="2000" b="1" dirty="0"/>
+              <a:t>quads</a:t>
+            </a:r>
+          </a:p>
+          <a:p>
+            <a:pPr marL="285750" indent="-228600" algn="just">
+              <a:lnSpc>
+                <a:spcPct val="90000"/>
+              </a:lnSpc>
+              <a:spcAft>
+                <a:spcPts val="600"/>
+              </a:spcAft>
+              <a:buFont typeface="Arial" panose="020B0604020202020204" pitchFamily="34" charset="0"/>
+              <a:buChar char="•"/>
+            </a:pPr>
+            <a:r>
+              <a:rPr lang="fr-FR" sz="2000" dirty="0"/>
+              <a:t>Plus de personnes </a:t>
+            </a:r>
+            <a:r>
+              <a:rPr lang="fr-FR" sz="2000" b="1" dirty="0"/>
               <a:t>indemnes</a:t>
             </a:r>
             <a:r>
-              <a:rPr lang="en-US" sz="2000" dirty="0"/>
+              <a:rPr lang="fr-FR" sz="2000" dirty="0"/>
               <a:t> pour les accidents avec des </a:t>
             </a:r>
             <a:r>
-              <a:rPr lang="en-US" sz="2000" dirty="0" err="1"/>
-              <a:t>poids</a:t>
+              <a:rPr lang="fr-FR" sz="2000" b="1" dirty="0"/>
+              <a:t>poids lourds</a:t>
             </a:r>
-            <a:r>
-              <a:rPr lang="en-US" sz="2000" dirty="0"/>
-              <a:t> </a:t>
-            </a:r>
-            <a:r>
-              <a:rPr lang="en-US" sz="2000" dirty="0" err="1"/>
-              <a:t>lourds</a:t>
-            </a:r>
-            <a:endParaRPr lang="en-US" sz="2000" dirty="0"/>
           </a:p>
         </p:txBody>
       </p:sp>

</xml_diff>